<commit_message>
Timing tweaks and other fixes
</commit_message>
<xml_diff>
--- a/01_01-ASPNETMVCvsMVC.pptx
+++ b/01_01-ASPNETMVCvsMVC.pptx
@@ -18,10 +18,11 @@
     <p:sldId id="280" r:id="rId12"/>
     <p:sldId id="281" r:id="rId13"/>
     <p:sldId id="282" r:id="rId14"/>
-    <p:sldId id="279" r:id="rId15"/>
-    <p:sldId id="283" r:id="rId16"/>
-    <p:sldId id="272" r:id="rId17"/>
-    <p:sldId id="284" r:id="rId18"/>
+    <p:sldId id="285" r:id="rId15"/>
+    <p:sldId id="279" r:id="rId16"/>
+    <p:sldId id="283" r:id="rId17"/>
+    <p:sldId id="272" r:id="rId18"/>
+    <p:sldId id="284" r:id="rId19"/>
   </p:sldIdLst>
   <p:sldSz cx="12192000" cy="6858000"/>
   <p:notesSz cx="6858000" cy="9144000"/>
@@ -170,6 +171,7 @@
             <p14:sldId id="280"/>
             <p14:sldId id="281"/>
             <p14:sldId id="282"/>
+            <p14:sldId id="285"/>
             <p14:sldId id="279"/>
             <p14:sldId id="283"/>
             <p14:sldId id="272"/>
@@ -21558,6 +21560,140 @@
       </p:grpSpPr>
       <p:sp>
         <p:nvSpPr>
+          <p:cNvPr id="2" name="Title 1">
+            <a:extLst>
+              <a:ext uri="{FF2B5EF4-FFF2-40B4-BE49-F238E27FC236}">
+                <a16:creationId xmlns:a16="http://schemas.microsoft.com/office/drawing/2014/main" id="{74C55A17-6B82-4D41-8195-F3315512341D}"/>
+              </a:ext>
+            </a:extLst>
+          </p:cNvPr>
+          <p:cNvSpPr>
+            <a:spLocks noGrp="1"/>
+          </p:cNvSpPr>
+          <p:nvPr>
+            <p:ph type="title"/>
+          </p:nvPr>
+        </p:nvSpPr>
+        <p:spPr/>
+        <p:txBody>
+          <a:bodyPr/>
+          <a:lstStyle/>
+          <a:p>
+            <a:r>
+              <a:rPr lang="en-US" dirty="0"/>
+              <a:t>“Controversial Order”</a:t>
+            </a:r>
+          </a:p>
+        </p:txBody>
+      </p:sp>
+      <p:sp>
+        <p:nvSpPr>
+          <p:cNvPr id="3" name="Content Placeholder 2">
+            <a:extLst>
+              <a:ext uri="{FF2B5EF4-FFF2-40B4-BE49-F238E27FC236}">
+                <a16:creationId xmlns:a16="http://schemas.microsoft.com/office/drawing/2014/main" id="{397F52A1-0184-4B78-A068-8CC4A8125B3A}"/>
+              </a:ext>
+            </a:extLst>
+          </p:cNvPr>
+          <p:cNvSpPr>
+            <a:spLocks noGrp="1"/>
+          </p:cNvSpPr>
+          <p:nvPr>
+            <p:ph idx="1"/>
+          </p:nvPr>
+        </p:nvSpPr>
+        <p:spPr/>
+        <p:txBody>
+          <a:bodyPr>
+            <a:normAutofit/>
+          </a:bodyPr>
+          <a:lstStyle/>
+          <a:p>
+            <a:pPr marL="0" indent="0" algn="ctr">
+              <a:buNone/>
+            </a:pPr>
+            <a:r>
+              <a:rPr lang="en-US" sz="4000" dirty="0"/>
+              <a:t>In order of </a:t>
+            </a:r>
+          </a:p>
+          <a:p>
+            <a:pPr marL="0" indent="0" algn="ctr">
+              <a:buNone/>
+            </a:pPr>
+            <a:r>
+              <a:rPr lang="en-US" sz="4000" i="1" dirty="0"/>
+              <a:t>least</a:t>
+            </a:r>
+            <a:r>
+              <a:rPr lang="en-US" sz="4000" dirty="0"/>
+              <a:t> opinionated </a:t>
+            </a:r>
+          </a:p>
+          <a:p>
+            <a:pPr marL="0" indent="0" algn="ctr">
+              <a:buNone/>
+            </a:pPr>
+            <a:r>
+              <a:rPr lang="en-US" sz="4000" dirty="0"/>
+              <a:t>to </a:t>
+            </a:r>
+          </a:p>
+          <a:p>
+            <a:pPr marL="0" indent="0" algn="ctr">
+              <a:buNone/>
+            </a:pPr>
+            <a:r>
+              <a:rPr lang="en-US" sz="4000" i="1" dirty="0"/>
+              <a:t>most</a:t>
+            </a:r>
+            <a:r>
+              <a:rPr lang="en-US" sz="4000" dirty="0"/>
+              <a:t> opinionated</a:t>
+            </a:r>
+            <a:endParaRPr lang="en-US" sz="3200" dirty="0">
+              <a:latin typeface="Calynda" panose="020B0609030804020204" pitchFamily="49" charset="0"/>
+              <a:ea typeface="Calynda" panose="020B0609030804020204" pitchFamily="49" charset="0"/>
+              <a:cs typeface="Calynda" panose="020B0609030804020204" pitchFamily="49" charset="0"/>
+            </a:endParaRPr>
+          </a:p>
+        </p:txBody>
+      </p:sp>
+    </p:spTree>
+    <p:extLst>
+      <p:ext uri="{BB962C8B-B14F-4D97-AF65-F5344CB8AC3E}">
+        <p14:creationId xmlns:p14="http://schemas.microsoft.com/office/powerpoint/2010/main" val="3739844900"/>
+      </p:ext>
+    </p:extLst>
+  </p:cSld>
+  <p:clrMapOvr>
+    <a:masterClrMapping/>
+  </p:clrMapOvr>
+  <p:transition>
+    <p:dissolve/>
+  </p:transition>
+</p:sld>
+</file>
+
+<file path=ppt/slides/slide11.xml><?xml version="1.0" encoding="utf-8"?>
+<p:sld xmlns:a="http://schemas.openxmlformats.org/drawingml/2006/main" xmlns:r="http://schemas.openxmlformats.org/officeDocument/2006/relationships" xmlns:p="http://schemas.openxmlformats.org/presentationml/2006/main" showMasterPhAnim="0">
+  <p:cSld>
+    <p:spTree>
+      <p:nvGrpSpPr>
+        <p:cNvPr id="1" name=""/>
+        <p:cNvGrpSpPr/>
+        <p:nvPr/>
+      </p:nvGrpSpPr>
+      <p:grpSpPr>
+        <a:xfrm>
+          <a:off x="0" y="0"/>
+          <a:ext cx="0" cy="0"/>
+          <a:chOff x="0" y="0"/>
+          <a:chExt cx="0" cy="0"/>
+        </a:xfrm>
+      </p:grpSpPr>
+      <p:sp>
+        <p:nvSpPr>
           <p:cNvPr id="4" name="Title 3">
             <a:extLst>
               <a:ext uri="{FF2B5EF4-FFF2-40B4-BE49-F238E27FC236}">
@@ -21642,11 +21778,173 @@
   <p:transition>
     <p:dissolve/>
   </p:transition>
+  <p:timing>
+    <p:tnLst>
+      <p:par>
+        <p:cTn id="1" dur="indefinite" restart="never" nodeType="tmRoot">
+          <p:childTnLst>
+            <p:seq concurrent="1" nextAc="seek">
+              <p:cTn id="2" dur="indefinite" nodeType="mainSeq">
+                <p:childTnLst>
+                  <p:par>
+                    <p:cTn id="3" fill="hold">
+                      <p:stCondLst>
+                        <p:cond delay="indefinite"/>
+                        <p:cond evt="onBegin" delay="0">
+                          <p:tn val="2"/>
+                        </p:cond>
+                      </p:stCondLst>
+                      <p:childTnLst>
+                        <p:par>
+                          <p:cTn id="4" fill="hold">
+                            <p:stCondLst>
+                              <p:cond delay="0"/>
+                            </p:stCondLst>
+                            <p:childTnLst>
+                              <p:par>
+                                <p:cTn id="5" presetID="-1074306296" presetClass="entr" presetSubtype="0" fill="hold" grpId="0" nodeType="afterEffect">
+                                  <p:stCondLst>
+                                    <p:cond delay="500"/>
+                                  </p:stCondLst>
+                                  <p:childTnLst>
+                                    <p:set>
+                                      <p:cBhvr>
+                                        <p:cTn id="6" dur="1" fill="hold">
+                                          <p:stCondLst>
+                                            <p:cond delay="499"/>
+                                          </p:stCondLst>
+                                        </p:cTn>
+                                        <p:tgtEl>
+                                          <p:spTgt spid="4"/>
+                                        </p:tgtEl>
+                                        <p:attrNameLst>
+                                          <p:attrName>style.visibility</p:attrName>
+                                        </p:attrNameLst>
+                                      </p:cBhvr>
+                                      <p:to>
+                                        <p:strVal val="visible"/>
+                                      </p:to>
+                                    </p:set>
+                                  </p:childTnLst>
+                                </p:cTn>
+                              </p:par>
+                            </p:childTnLst>
+                          </p:cTn>
+                        </p:par>
+                        <p:par>
+                          <p:cTn id="7" fill="hold">
+                            <p:stCondLst>
+                              <p:cond delay="1000"/>
+                            </p:stCondLst>
+                            <p:childTnLst>
+                              <p:par>
+                                <p:cTn id="8" presetID="-1074306296" presetClass="entr" presetSubtype="0" fill="hold" grpId="0" nodeType="afterEffect">
+                                  <p:stCondLst>
+                                    <p:cond delay="500"/>
+                                  </p:stCondLst>
+                                  <p:childTnLst>
+                                    <p:set>
+                                      <p:cBhvr>
+                                        <p:cTn id="9" dur="1" fill="hold">
+                                          <p:stCondLst>
+                                            <p:cond delay="499"/>
+                                          </p:stCondLst>
+                                        </p:cTn>
+                                        <p:tgtEl>
+                                          <p:spTgt spid="5">
+                                            <p:txEl>
+                                              <p:pRg st="0" end="0"/>
+                                            </p:txEl>
+                                          </p:spTgt>
+                                        </p:tgtEl>
+                                        <p:attrNameLst>
+                                          <p:attrName>style.visibility</p:attrName>
+                                        </p:attrNameLst>
+                                      </p:cBhvr>
+                                      <p:to>
+                                        <p:strVal val="visible"/>
+                                      </p:to>
+                                    </p:set>
+                                  </p:childTnLst>
+                                </p:cTn>
+                              </p:par>
+                            </p:childTnLst>
+                          </p:cTn>
+                        </p:par>
+                        <p:par>
+                          <p:cTn id="10" fill="hold">
+                            <p:stCondLst>
+                              <p:cond delay="2000"/>
+                            </p:stCondLst>
+                            <p:childTnLst>
+                              <p:par>
+                                <p:cTn id="11" presetID="-1074306296" presetClass="entr" presetSubtype="0" fill="hold" grpId="0" nodeType="afterEffect">
+                                  <p:stCondLst>
+                                    <p:cond delay="500"/>
+                                  </p:stCondLst>
+                                  <p:childTnLst>
+                                    <p:set>
+                                      <p:cBhvr>
+                                        <p:cTn id="12" dur="1" fill="hold">
+                                          <p:stCondLst>
+                                            <p:cond delay="499"/>
+                                          </p:stCondLst>
+                                        </p:cTn>
+                                        <p:tgtEl>
+                                          <p:spTgt spid="5">
+                                            <p:txEl>
+                                              <p:pRg st="1" end="1"/>
+                                            </p:txEl>
+                                          </p:spTgt>
+                                        </p:tgtEl>
+                                        <p:attrNameLst>
+                                          <p:attrName>style.visibility</p:attrName>
+                                        </p:attrNameLst>
+                                      </p:cBhvr>
+                                      <p:to>
+                                        <p:strVal val="visible"/>
+                                      </p:to>
+                                    </p:set>
+                                  </p:childTnLst>
+                                </p:cTn>
+                              </p:par>
+                            </p:childTnLst>
+                          </p:cTn>
+                        </p:par>
+                      </p:childTnLst>
+                    </p:cTn>
+                  </p:par>
+                </p:childTnLst>
+              </p:cTn>
+              <p:prevCondLst>
+                <p:cond evt="onPrev" delay="0">
+                  <p:tgtEl>
+                    <p:sldTgt/>
+                  </p:tgtEl>
+                </p:cond>
+              </p:prevCondLst>
+              <p:nextCondLst>
+                <p:cond evt="onNext" delay="0">
+                  <p:tgtEl>
+                    <p:sldTgt/>
+                  </p:tgtEl>
+                </p:cond>
+              </p:nextCondLst>
+            </p:seq>
+          </p:childTnLst>
+        </p:cTn>
+      </p:par>
+    </p:tnLst>
+    <p:bldLst>
+      <p:bldP spid="4" grpId="0" autoUpdateAnimBg="0"/>
+      <p:bldP spid="5" grpId="0" build="p" bldLvl="5" autoUpdateAnimBg="0"/>
+    </p:bldLst>
+  </p:timing>
 </p:sld>
 </file>
 
 <file path=ppt/slides/slide2.xml><?xml version="1.0" encoding="utf-8"?>
-<p:sld xmlns:a="http://schemas.openxmlformats.org/drawingml/2006/main" xmlns:r="http://schemas.openxmlformats.org/officeDocument/2006/relationships" xmlns:p="http://schemas.openxmlformats.org/presentationml/2006/main">
+<p:sld xmlns:a="http://schemas.openxmlformats.org/drawingml/2006/main" xmlns:r="http://schemas.openxmlformats.org/officeDocument/2006/relationships" xmlns:p="http://schemas.openxmlformats.org/presentationml/2006/main" showMasterPhAnim="0">
   <p:cSld>
     <p:spTree>
       <p:nvGrpSpPr>
@@ -21745,6 +22043,168 @@
   <p:transition>
     <p:dissolve/>
   </p:transition>
+  <p:timing>
+    <p:tnLst>
+      <p:par>
+        <p:cTn id="1" dur="indefinite" restart="never" nodeType="tmRoot">
+          <p:childTnLst>
+            <p:seq concurrent="1" nextAc="seek">
+              <p:cTn id="2" dur="indefinite" nodeType="mainSeq">
+                <p:childTnLst>
+                  <p:par>
+                    <p:cTn id="3" fill="hold">
+                      <p:stCondLst>
+                        <p:cond delay="indefinite"/>
+                        <p:cond evt="onBegin" delay="0">
+                          <p:tn val="2"/>
+                        </p:cond>
+                      </p:stCondLst>
+                      <p:childTnLst>
+                        <p:par>
+                          <p:cTn id="4" fill="hold">
+                            <p:stCondLst>
+                              <p:cond delay="0"/>
+                            </p:stCondLst>
+                            <p:childTnLst>
+                              <p:par>
+                                <p:cTn id="5" presetID="-1074306296" presetClass="entr" presetSubtype="0" fill="hold" grpId="0" nodeType="afterEffect">
+                                  <p:stCondLst>
+                                    <p:cond delay="1000"/>
+                                  </p:stCondLst>
+                                  <p:childTnLst>
+                                    <p:set>
+                                      <p:cBhvr>
+                                        <p:cTn id="6" dur="1" fill="hold">
+                                          <p:stCondLst>
+                                            <p:cond delay="499"/>
+                                          </p:stCondLst>
+                                        </p:cTn>
+                                        <p:tgtEl>
+                                          <p:spTgt spid="4"/>
+                                        </p:tgtEl>
+                                        <p:attrNameLst>
+                                          <p:attrName>style.visibility</p:attrName>
+                                        </p:attrNameLst>
+                                      </p:cBhvr>
+                                      <p:to>
+                                        <p:strVal val="visible"/>
+                                      </p:to>
+                                    </p:set>
+                                  </p:childTnLst>
+                                </p:cTn>
+                              </p:par>
+                            </p:childTnLst>
+                          </p:cTn>
+                        </p:par>
+                        <p:par>
+                          <p:cTn id="7" fill="hold">
+                            <p:stCondLst>
+                              <p:cond delay="1500"/>
+                            </p:stCondLst>
+                            <p:childTnLst>
+                              <p:par>
+                                <p:cTn id="8" presetID="-1074306296" presetClass="entr" presetSubtype="0" fill="hold" grpId="0" nodeType="afterEffect">
+                                  <p:stCondLst>
+                                    <p:cond delay="1000"/>
+                                  </p:stCondLst>
+                                  <p:childTnLst>
+                                    <p:set>
+                                      <p:cBhvr>
+                                        <p:cTn id="9" dur="1" fill="hold">
+                                          <p:stCondLst>
+                                            <p:cond delay="499"/>
+                                          </p:stCondLst>
+                                        </p:cTn>
+                                        <p:tgtEl>
+                                          <p:spTgt spid="5">
+                                            <p:txEl>
+                                              <p:pRg st="0" end="0"/>
+                                            </p:txEl>
+                                          </p:spTgt>
+                                        </p:tgtEl>
+                                        <p:attrNameLst>
+                                          <p:attrName>style.visibility</p:attrName>
+                                        </p:attrNameLst>
+                                      </p:cBhvr>
+                                      <p:to>
+                                        <p:strVal val="visible"/>
+                                      </p:to>
+                                    </p:set>
+                                  </p:childTnLst>
+                                </p:cTn>
+                              </p:par>
+                            </p:childTnLst>
+                          </p:cTn>
+                        </p:par>
+                        <p:par>
+                          <p:cTn id="10" fill="hold">
+                            <p:stCondLst>
+                              <p:cond delay="3000"/>
+                            </p:stCondLst>
+                            <p:childTnLst>
+                              <p:par>
+                                <p:cTn id="11" presetID="-1074306296" presetClass="entr" presetSubtype="0" fill="hold" grpId="0" nodeType="afterEffect">
+                                  <p:stCondLst>
+                                    <p:cond delay="1000"/>
+                                  </p:stCondLst>
+                                  <p:childTnLst>
+                                    <p:set>
+                                      <p:cBhvr>
+                                        <p:cTn id="12" dur="1" fill="hold">
+                                          <p:stCondLst>
+                                            <p:cond delay="499"/>
+                                          </p:stCondLst>
+                                        </p:cTn>
+                                        <p:tgtEl>
+                                          <p:spTgt spid="5">
+                                            <p:txEl>
+                                              <p:pRg st="1" end="1"/>
+                                            </p:txEl>
+                                          </p:spTgt>
+                                        </p:tgtEl>
+                                        <p:attrNameLst>
+                                          <p:attrName>style.visibility</p:attrName>
+                                        </p:attrNameLst>
+                                      </p:cBhvr>
+                                      <p:to>
+                                        <p:strVal val="visible"/>
+                                      </p:to>
+                                    </p:set>
+                                  </p:childTnLst>
+                                </p:cTn>
+                              </p:par>
+                            </p:childTnLst>
+                          </p:cTn>
+                        </p:par>
+                      </p:childTnLst>
+                    </p:cTn>
+                  </p:par>
+                </p:childTnLst>
+              </p:cTn>
+              <p:prevCondLst>
+                <p:cond evt="onPrev" delay="0">
+                  <p:tgtEl>
+                    <p:sldTgt/>
+                  </p:tgtEl>
+                </p:cond>
+              </p:prevCondLst>
+              <p:nextCondLst>
+                <p:cond evt="onNext" delay="0">
+                  <p:tgtEl>
+                    <p:sldTgt/>
+                  </p:tgtEl>
+                </p:cond>
+              </p:nextCondLst>
+            </p:seq>
+          </p:childTnLst>
+        </p:cTn>
+      </p:par>
+    </p:tnLst>
+    <p:bldLst>
+      <p:bldP spid="4" grpId="0" autoUpdateAnimBg="0"/>
+      <p:bldP spid="5" grpId="0" build="p" bldLvl="5" autoUpdateAnimBg="0"/>
+    </p:bldLst>
+  </p:timing>
 </p:sld>
 </file>
 
@@ -22636,7 +23096,7 @@
           <a:effectLst/>
           <a:extLst>
             <a:ext uri="{AF507438-7753-43e0-B8FC-AC1667EBCBE1}">
-              <a14:hiddenEffects xmlns="" xmlns:a14="http://schemas.microsoft.com/office/drawing/2010/main">
+              <a14:hiddenEffects xmlns:a14="http://schemas.microsoft.com/office/drawing/2010/main" xmlns="">
                 <a:effectLst>
                   <a:outerShdw blurRad="63500" dist="38099" dir="2700000" algn="ctr" rotWithShape="0">
                     <a:schemeClr val="bg2">
@@ -22730,7 +23190,7 @@
           <a:effectLst/>
           <a:extLst>
             <a:ext uri="{AF507438-7753-43e0-B8FC-AC1667EBCBE1}">
-              <a14:hiddenEffects xmlns="" xmlns:a14="http://schemas.microsoft.com/office/drawing/2010/main">
+              <a14:hiddenEffects xmlns:a14="http://schemas.microsoft.com/office/drawing/2010/main" xmlns="">
                 <a:effectLst>
                   <a:outerShdw blurRad="63500" dist="38099" dir="2700000" algn="ctr" rotWithShape="0">
                     <a:schemeClr val="bg2">
@@ -22782,7 +23242,7 @@
           <a:effectLst/>
           <a:extLst>
             <a:ext uri="{AF507438-7753-43e0-B8FC-AC1667EBCBE1}">
-              <a14:hiddenEffects xmlns="" xmlns:a14="http://schemas.microsoft.com/office/drawing/2010/main">
+              <a14:hiddenEffects xmlns:a14="http://schemas.microsoft.com/office/drawing/2010/main" xmlns="">
                 <a:effectLst>
                   <a:outerShdw blurRad="63500" dist="38099" dir="2700000" algn="ctr" rotWithShape="0">
                     <a:schemeClr val="bg2">
@@ -22834,7 +23294,7 @@
           <a:effectLst/>
           <a:extLst>
             <a:ext uri="{AF507438-7753-43e0-B8FC-AC1667EBCBE1}">
-              <a14:hiddenEffects xmlns="" xmlns:a14="http://schemas.microsoft.com/office/drawing/2010/main">
+              <a14:hiddenEffects xmlns:a14="http://schemas.microsoft.com/office/drawing/2010/main" xmlns="">
                 <a:effectLst>
                   <a:outerShdw blurRad="63500" dist="38099" dir="2700000" algn="ctr" rotWithShape="0">
                     <a:schemeClr val="bg2">
@@ -23157,7 +23617,7 @@
           <a:effectLst/>
           <a:extLst>
             <a:ext uri="{AF507438-7753-43e0-B8FC-AC1667EBCBE1}">
-              <a14:hiddenEffects xmlns="" xmlns:a14="http://schemas.microsoft.com/office/drawing/2010/main">
+              <a14:hiddenEffects xmlns:a14="http://schemas.microsoft.com/office/drawing/2010/main" xmlns="">
                 <a:effectLst>
                   <a:outerShdw blurRad="63500" dist="38099" dir="2700000" algn="ctr" rotWithShape="0">
                     <a:schemeClr val="bg2">
@@ -23251,7 +23711,7 @@
           <a:effectLst/>
           <a:extLst>
             <a:ext uri="{AF507438-7753-43e0-B8FC-AC1667EBCBE1}">
-              <a14:hiddenEffects xmlns="" xmlns:a14="http://schemas.microsoft.com/office/drawing/2010/main">
+              <a14:hiddenEffects xmlns:a14="http://schemas.microsoft.com/office/drawing/2010/main" xmlns="">
                 <a:effectLst>
                   <a:outerShdw blurRad="63500" dist="38099" dir="2700000" algn="ctr" rotWithShape="0">
                     <a:schemeClr val="bg2">
@@ -23303,7 +23763,7 @@
           <a:effectLst/>
           <a:extLst>
             <a:ext uri="{AF507438-7753-43e0-B8FC-AC1667EBCBE1}">
-              <a14:hiddenEffects xmlns="" xmlns:a14="http://schemas.microsoft.com/office/drawing/2010/main">
+              <a14:hiddenEffects xmlns:a14="http://schemas.microsoft.com/office/drawing/2010/main" xmlns="">
                 <a:effectLst>
                   <a:outerShdw blurRad="63500" dist="38099" dir="2700000" algn="ctr" rotWithShape="0">
                     <a:schemeClr val="bg2">
@@ -23355,7 +23815,7 @@
           <a:effectLst/>
           <a:extLst>
             <a:ext uri="{AF507438-7753-43e0-B8FC-AC1667EBCBE1}">
-              <a14:hiddenEffects xmlns="" xmlns:a14="http://schemas.microsoft.com/office/drawing/2010/main">
+              <a14:hiddenEffects xmlns:a14="http://schemas.microsoft.com/office/drawing/2010/main" xmlns="">
                 <a:effectLst>
                   <a:outerShdw blurRad="63500" dist="38099" dir="2700000" algn="ctr" rotWithShape="0">
                     <a:schemeClr val="bg2">
@@ -23405,7 +23865,7 @@
           <a:effectLst/>
           <a:extLst>
             <a:ext uri="{AF507438-7753-43e0-B8FC-AC1667EBCBE1}">
-              <a14:hiddenEffects xmlns="" xmlns:a14="http://schemas.microsoft.com/office/drawing/2010/main">
+              <a14:hiddenEffects xmlns:a14="http://schemas.microsoft.com/office/drawing/2010/main" xmlns="">
                 <a:effectLst>
                   <a:outerShdw blurRad="63500" dist="38099" dir="2700000" algn="ctr" rotWithShape="0">
                     <a:schemeClr val="bg2">
@@ -23511,7 +23971,261 @@
 </file>
 
 <file path=ppt/slides/slide7.xml><?xml version="1.0" encoding="utf-8"?>
-<p:sld xmlns:a="http://schemas.openxmlformats.org/drawingml/2006/main" xmlns:r="http://schemas.openxmlformats.org/officeDocument/2006/relationships" xmlns:p="http://schemas.openxmlformats.org/presentationml/2006/main">
+<p:sld xmlns:a="http://schemas.openxmlformats.org/drawingml/2006/main" xmlns:r="http://schemas.openxmlformats.org/officeDocument/2006/relationships" xmlns:p="http://schemas.openxmlformats.org/presentationml/2006/main" showMasterPhAnim="0">
+  <p:cSld>
+    <p:spTree>
+      <p:nvGrpSpPr>
+        <p:cNvPr id="1" name=""/>
+        <p:cNvGrpSpPr/>
+        <p:nvPr/>
+      </p:nvGrpSpPr>
+      <p:grpSpPr>
+        <a:xfrm>
+          <a:off x="0" y="0"/>
+          <a:ext cx="0" cy="0"/>
+          <a:chOff x="0" y="0"/>
+          <a:chExt cx="0" cy="0"/>
+        </a:xfrm>
+      </p:grpSpPr>
+      <p:sp>
+        <p:nvSpPr>
+          <p:cNvPr id="2" name="Title 1">
+            <a:extLst>
+              <a:ext uri="{FF2B5EF4-FFF2-40B4-BE49-F238E27FC236}">
+                <a16:creationId xmlns:a16="http://schemas.microsoft.com/office/drawing/2014/main" id="{9F18B8BF-FB8D-4DAA-ADA2-673D3C7417DA}"/>
+              </a:ext>
+            </a:extLst>
+          </p:cNvPr>
+          <p:cNvSpPr>
+            <a:spLocks noGrp="1"/>
+          </p:cNvSpPr>
+          <p:nvPr>
+            <p:ph type="title"/>
+          </p:nvPr>
+        </p:nvSpPr>
+        <p:spPr/>
+        <p:txBody>
+          <a:bodyPr/>
+          <a:lstStyle/>
+          <a:p>
+            <a:r>
+              <a:rPr lang="en-US" dirty="0"/>
+              <a:t>Complex applications require more…</a:t>
+            </a:r>
+          </a:p>
+        </p:txBody>
+      </p:sp>
+      <p:sp>
+        <p:nvSpPr>
+          <p:cNvPr id="3" name="Content Placeholder 2">
+            <a:extLst>
+              <a:ext uri="{FF2B5EF4-FFF2-40B4-BE49-F238E27FC236}">
+                <a16:creationId xmlns:a16="http://schemas.microsoft.com/office/drawing/2014/main" id="{F9610017-4FB0-445F-BE39-4003703F9DB8}"/>
+              </a:ext>
+            </a:extLst>
+          </p:cNvPr>
+          <p:cNvSpPr>
+            <a:spLocks noGrp="1"/>
+          </p:cNvSpPr>
+          <p:nvPr>
+            <p:ph idx="1"/>
+          </p:nvPr>
+        </p:nvSpPr>
+        <p:spPr/>
+        <p:txBody>
+          <a:bodyPr/>
+          <a:lstStyle/>
+          <a:p>
+            <a:r>
+              <a:rPr lang="en-US" dirty="0"/>
+              <a:t>Higher standard of design</a:t>
+            </a:r>
+          </a:p>
+          <a:p>
+            <a:r>
+              <a:rPr lang="en-US" dirty="0"/>
+              <a:t>More disciplined application of principles and patterns</a:t>
+            </a:r>
+          </a:p>
+        </p:txBody>
+      </p:sp>
+    </p:spTree>
+    <p:extLst>
+      <p:ext uri="{BB962C8B-B14F-4D97-AF65-F5344CB8AC3E}">
+        <p14:creationId xmlns:p14="http://schemas.microsoft.com/office/powerpoint/2010/main" val="1797182267"/>
+      </p:ext>
+    </p:extLst>
+  </p:cSld>
+  <p:clrMapOvr>
+    <a:masterClrMapping/>
+  </p:clrMapOvr>
+  <p:transition>
+    <p:dissolve/>
+  </p:transition>
+  <p:timing>
+    <p:tnLst>
+      <p:par>
+        <p:cTn id="1" dur="indefinite" restart="never" nodeType="tmRoot">
+          <p:childTnLst>
+            <p:seq concurrent="1" nextAc="seek">
+              <p:cTn id="2" dur="indefinite" nodeType="mainSeq">
+                <p:childTnLst>
+                  <p:par>
+                    <p:cTn id="3" fill="hold">
+                      <p:stCondLst>
+                        <p:cond delay="indefinite"/>
+                      </p:stCondLst>
+                      <p:childTnLst>
+                        <p:par>
+                          <p:cTn id="4" fill="hold">
+                            <p:stCondLst>
+                              <p:cond delay="0"/>
+                            </p:stCondLst>
+                            <p:childTnLst>
+                              <p:par>
+                                <p:cTn id="5" presetID="-1074306296" presetClass="entr" presetSubtype="0" fill="hold" grpId="0" nodeType="clickEffect">
+                                  <p:stCondLst>
+                                    <p:cond delay="0"/>
+                                  </p:stCondLst>
+                                  <p:childTnLst>
+                                    <p:set>
+                                      <p:cBhvr>
+                                        <p:cTn id="6" dur="1" fill="hold">
+                                          <p:stCondLst>
+                                            <p:cond delay="499"/>
+                                          </p:stCondLst>
+                                        </p:cTn>
+                                        <p:tgtEl>
+                                          <p:spTgt spid="2"/>
+                                        </p:tgtEl>
+                                        <p:attrNameLst>
+                                          <p:attrName>style.visibility</p:attrName>
+                                        </p:attrNameLst>
+                                      </p:cBhvr>
+                                      <p:to>
+                                        <p:strVal val="visible"/>
+                                      </p:to>
+                                    </p:set>
+                                  </p:childTnLst>
+                                </p:cTn>
+                              </p:par>
+                            </p:childTnLst>
+                          </p:cTn>
+                        </p:par>
+                        <p:par>
+                          <p:cTn id="7" fill="hold">
+                            <p:stCondLst>
+                              <p:cond delay="500"/>
+                            </p:stCondLst>
+                            <p:childTnLst>
+                              <p:par>
+                                <p:cTn id="8" presetID="-1074306296" presetClass="entr" presetSubtype="0" fill="hold" grpId="0" nodeType="afterEffect">
+                                  <p:stCondLst>
+                                    <p:cond delay="1000"/>
+                                  </p:stCondLst>
+                                  <p:childTnLst>
+                                    <p:set>
+                                      <p:cBhvr>
+                                        <p:cTn id="9" dur="1" fill="hold">
+                                          <p:stCondLst>
+                                            <p:cond delay="499"/>
+                                          </p:stCondLst>
+                                        </p:cTn>
+                                        <p:tgtEl>
+                                          <p:spTgt spid="3">
+                                            <p:txEl>
+                                              <p:pRg st="0" end="0"/>
+                                            </p:txEl>
+                                          </p:spTgt>
+                                        </p:tgtEl>
+                                        <p:attrNameLst>
+                                          <p:attrName>style.visibility</p:attrName>
+                                        </p:attrNameLst>
+                                      </p:cBhvr>
+                                      <p:to>
+                                        <p:strVal val="visible"/>
+                                      </p:to>
+                                    </p:set>
+                                  </p:childTnLst>
+                                </p:cTn>
+                              </p:par>
+                            </p:childTnLst>
+                          </p:cTn>
+                        </p:par>
+                        <p:par>
+                          <p:cTn id="10" fill="hold">
+                            <p:stCondLst>
+                              <p:cond delay="2000"/>
+                            </p:stCondLst>
+                            <p:childTnLst>
+                              <p:par>
+                                <p:cTn id="11" presetID="-1074306296" presetClass="entr" presetSubtype="0" fill="hold" grpId="0" nodeType="afterEffect">
+                                  <p:stCondLst>
+                                    <p:cond delay="1000"/>
+                                  </p:stCondLst>
+                                  <p:childTnLst>
+                                    <p:set>
+                                      <p:cBhvr>
+                                        <p:cTn id="12" dur="1" fill="hold">
+                                          <p:stCondLst>
+                                            <p:cond delay="499"/>
+                                          </p:stCondLst>
+                                        </p:cTn>
+                                        <p:tgtEl>
+                                          <p:spTgt spid="3">
+                                            <p:txEl>
+                                              <p:pRg st="1" end="1"/>
+                                            </p:txEl>
+                                          </p:spTgt>
+                                        </p:tgtEl>
+                                        <p:attrNameLst>
+                                          <p:attrName>style.visibility</p:attrName>
+                                        </p:attrNameLst>
+                                      </p:cBhvr>
+                                      <p:to>
+                                        <p:strVal val="visible"/>
+                                      </p:to>
+                                    </p:set>
+                                  </p:childTnLst>
+                                </p:cTn>
+                              </p:par>
+                            </p:childTnLst>
+                          </p:cTn>
+                        </p:par>
+                      </p:childTnLst>
+                    </p:cTn>
+                  </p:par>
+                </p:childTnLst>
+              </p:cTn>
+              <p:prevCondLst>
+                <p:cond evt="onPrev" delay="0">
+                  <p:tgtEl>
+                    <p:sldTgt/>
+                  </p:tgtEl>
+                </p:cond>
+              </p:prevCondLst>
+              <p:nextCondLst>
+                <p:cond evt="onNext" delay="0">
+                  <p:tgtEl>
+                    <p:sldTgt/>
+                  </p:tgtEl>
+                </p:cond>
+              </p:nextCondLst>
+            </p:seq>
+          </p:childTnLst>
+        </p:cTn>
+      </p:par>
+    </p:tnLst>
+    <p:bldLst>
+      <p:bldP spid="2" grpId="0" autoUpdateAnimBg="0"/>
+      <p:bldP spid="3" grpId="0" build="p" bldLvl="5" autoUpdateAnimBg="0"/>
+    </p:bldLst>
+  </p:timing>
+</p:sld>
+</file>
+
+<file path=ppt/slides/slide8.xml><?xml version="1.0" encoding="utf-8"?>
+<p:sld xmlns:a="http://schemas.openxmlformats.org/drawingml/2006/main" xmlns:r="http://schemas.openxmlformats.org/officeDocument/2006/relationships" xmlns:p="http://schemas.openxmlformats.org/presentationml/2006/main" showMasterPhAnim="0">
   <p:cSld>
     <p:spTree>
       <p:nvGrpSpPr>
@@ -23603,10 +24317,169 @@
   <p:transition>
     <p:dissolve/>
   </p:transition>
+  <p:timing>
+    <p:tnLst>
+      <p:par>
+        <p:cTn id="1" dur="indefinite" restart="never" nodeType="tmRoot">
+          <p:childTnLst>
+            <p:seq concurrent="1" nextAc="seek">
+              <p:cTn id="2" dur="indefinite" nodeType="mainSeq">
+                <p:childTnLst>
+                  <p:par>
+                    <p:cTn id="3" fill="hold">
+                      <p:stCondLst>
+                        <p:cond delay="indefinite"/>
+                      </p:stCondLst>
+                      <p:childTnLst>
+                        <p:par>
+                          <p:cTn id="4" fill="hold">
+                            <p:stCondLst>
+                              <p:cond delay="0"/>
+                            </p:stCondLst>
+                            <p:childTnLst>
+                              <p:par>
+                                <p:cTn id="5" presetID="-1074306296" presetClass="entr" presetSubtype="0" fill="hold" grpId="0" nodeType="clickEffect">
+                                  <p:stCondLst>
+                                    <p:cond delay="0"/>
+                                  </p:stCondLst>
+                                  <p:childTnLst>
+                                    <p:set>
+                                      <p:cBhvr>
+                                        <p:cTn id="6" dur="1" fill="hold">
+                                          <p:stCondLst>
+                                            <p:cond delay="499"/>
+                                          </p:stCondLst>
+                                        </p:cTn>
+                                        <p:tgtEl>
+                                          <p:spTgt spid="6"/>
+                                        </p:tgtEl>
+                                        <p:attrNameLst>
+                                          <p:attrName>style.visibility</p:attrName>
+                                        </p:attrNameLst>
+                                      </p:cBhvr>
+                                      <p:to>
+                                        <p:strVal val="visible"/>
+                                      </p:to>
+                                    </p:set>
+                                  </p:childTnLst>
+                                </p:cTn>
+                              </p:par>
+                            </p:childTnLst>
+                          </p:cTn>
+                        </p:par>
+                        <p:par>
+                          <p:cTn id="7" fill="hold">
+                            <p:stCondLst>
+                              <p:cond delay="500"/>
+                            </p:stCondLst>
+                            <p:childTnLst>
+                              <p:par>
+                                <p:cTn id="8" presetID="-1074306296" presetClass="entr" presetSubtype="0" fill="hold" grpId="0" nodeType="afterEffect">
+                                  <p:stCondLst>
+                                    <p:cond delay="1000"/>
+                                  </p:stCondLst>
+                                  <p:childTnLst>
+                                    <p:set>
+                                      <p:cBhvr>
+                                        <p:cTn id="9" dur="1" fill="hold">
+                                          <p:stCondLst>
+                                            <p:cond delay="499"/>
+                                          </p:stCondLst>
+                                        </p:cTn>
+                                        <p:tgtEl>
+                                          <p:spTgt spid="7">
+                                            <p:txEl>
+                                              <p:pRg st="0" end="0"/>
+                                            </p:txEl>
+                                          </p:spTgt>
+                                        </p:tgtEl>
+                                        <p:attrNameLst>
+                                          <p:attrName>style.visibility</p:attrName>
+                                        </p:attrNameLst>
+                                      </p:cBhvr>
+                                      <p:to>
+                                        <p:strVal val="visible"/>
+                                      </p:to>
+                                    </p:set>
+                                  </p:childTnLst>
+                                </p:cTn>
+                              </p:par>
+                            </p:childTnLst>
+                          </p:cTn>
+                        </p:par>
+                        <p:par>
+                          <p:cTn id="10" fill="hold">
+                            <p:stCondLst>
+                              <p:cond delay="2000"/>
+                            </p:stCondLst>
+                            <p:childTnLst>
+                              <p:par>
+                                <p:cTn id="11" presetID="-1074306296" presetClass="entr" presetSubtype="0" fill="hold" grpId="0" nodeType="afterEffect">
+                                  <p:stCondLst>
+                                    <p:cond delay="1000"/>
+                                  </p:stCondLst>
+                                  <p:childTnLst>
+                                    <p:set>
+                                      <p:cBhvr>
+                                        <p:cTn id="12" dur="1" fill="hold">
+                                          <p:stCondLst>
+                                            <p:cond delay="499"/>
+                                          </p:stCondLst>
+                                        </p:cTn>
+                                        <p:tgtEl>
+                                          <p:spTgt spid="7">
+                                            <p:txEl>
+                                              <p:pRg st="1" end="1"/>
+                                            </p:txEl>
+                                          </p:spTgt>
+                                        </p:tgtEl>
+                                        <p:attrNameLst>
+                                          <p:attrName>style.visibility</p:attrName>
+                                        </p:attrNameLst>
+                                      </p:cBhvr>
+                                      <p:to>
+                                        <p:strVal val="visible"/>
+                                      </p:to>
+                                    </p:set>
+                                  </p:childTnLst>
+                                </p:cTn>
+                              </p:par>
+                            </p:childTnLst>
+                          </p:cTn>
+                        </p:par>
+                      </p:childTnLst>
+                    </p:cTn>
+                  </p:par>
+                </p:childTnLst>
+              </p:cTn>
+              <p:prevCondLst>
+                <p:cond evt="onPrev" delay="0">
+                  <p:tgtEl>
+                    <p:sldTgt/>
+                  </p:tgtEl>
+                </p:cond>
+              </p:prevCondLst>
+              <p:nextCondLst>
+                <p:cond evt="onNext" delay="0">
+                  <p:tgtEl>
+                    <p:sldTgt/>
+                  </p:tgtEl>
+                </p:cond>
+              </p:nextCondLst>
+            </p:seq>
+          </p:childTnLst>
+        </p:cTn>
+      </p:par>
+    </p:tnLst>
+    <p:bldLst>
+      <p:bldP spid="6" grpId="0" autoUpdateAnimBg="0"/>
+      <p:bldP spid="7" grpId="0" build="p" bldLvl="5" autoUpdateAnimBg="0"/>
+    </p:bldLst>
+  </p:timing>
 </p:sld>
 </file>
 
-<file path=ppt/slides/slide8.xml><?xml version="1.0" encoding="utf-8"?>
+<file path=ppt/slides/slide9.xml><?xml version="1.0" encoding="utf-8"?>
 <p:sld xmlns:a="http://schemas.openxmlformats.org/drawingml/2006/main" xmlns:r="http://schemas.openxmlformats.org/officeDocument/2006/relationships" xmlns:p="http://schemas.openxmlformats.org/presentationml/2006/main" showMasterPhAnim="0">
   <p:cSld>
     <p:spTree>
@@ -24207,140 +25080,6 @@
 </p:sld>
 </file>
 
-<file path=ppt/slides/slide9.xml><?xml version="1.0" encoding="utf-8"?>
-<p:sld xmlns:a="http://schemas.openxmlformats.org/drawingml/2006/main" xmlns:r="http://schemas.openxmlformats.org/officeDocument/2006/relationships" xmlns:p="http://schemas.openxmlformats.org/presentationml/2006/main">
-  <p:cSld>
-    <p:spTree>
-      <p:nvGrpSpPr>
-        <p:cNvPr id="1" name=""/>
-        <p:cNvGrpSpPr/>
-        <p:nvPr/>
-      </p:nvGrpSpPr>
-      <p:grpSpPr>
-        <a:xfrm>
-          <a:off x="0" y="0"/>
-          <a:ext cx="0" cy="0"/>
-          <a:chOff x="0" y="0"/>
-          <a:chExt cx="0" cy="0"/>
-        </a:xfrm>
-      </p:grpSpPr>
-      <p:sp>
-        <p:nvSpPr>
-          <p:cNvPr id="2" name="Title 1">
-            <a:extLst>
-              <a:ext uri="{FF2B5EF4-FFF2-40B4-BE49-F238E27FC236}">
-                <a16:creationId xmlns:a16="http://schemas.microsoft.com/office/drawing/2014/main" id="{74C55A17-6B82-4D41-8195-F3315512341D}"/>
-              </a:ext>
-            </a:extLst>
-          </p:cNvPr>
-          <p:cNvSpPr>
-            <a:spLocks noGrp="1"/>
-          </p:cNvSpPr>
-          <p:nvPr>
-            <p:ph type="title"/>
-          </p:nvPr>
-        </p:nvSpPr>
-        <p:spPr/>
-        <p:txBody>
-          <a:bodyPr/>
-          <a:lstStyle/>
-          <a:p>
-            <a:r>
-              <a:rPr lang="en-US" dirty="0"/>
-              <a:t>“Controversial Order”</a:t>
-            </a:r>
-          </a:p>
-        </p:txBody>
-      </p:sp>
-      <p:sp>
-        <p:nvSpPr>
-          <p:cNvPr id="3" name="Content Placeholder 2">
-            <a:extLst>
-              <a:ext uri="{FF2B5EF4-FFF2-40B4-BE49-F238E27FC236}">
-                <a16:creationId xmlns:a16="http://schemas.microsoft.com/office/drawing/2014/main" id="{397F52A1-0184-4B78-A068-8CC4A8125B3A}"/>
-              </a:ext>
-            </a:extLst>
-          </p:cNvPr>
-          <p:cNvSpPr>
-            <a:spLocks noGrp="1"/>
-          </p:cNvSpPr>
-          <p:nvPr>
-            <p:ph idx="1"/>
-          </p:nvPr>
-        </p:nvSpPr>
-        <p:spPr/>
-        <p:txBody>
-          <a:bodyPr>
-            <a:normAutofit/>
-          </a:bodyPr>
-          <a:lstStyle/>
-          <a:p>
-            <a:pPr marL="0" indent="0" algn="ctr">
-              <a:buNone/>
-            </a:pPr>
-            <a:r>
-              <a:rPr lang="en-US" sz="4000" dirty="0"/>
-              <a:t>In order of </a:t>
-            </a:r>
-          </a:p>
-          <a:p>
-            <a:pPr marL="0" indent="0" algn="ctr">
-              <a:buNone/>
-            </a:pPr>
-            <a:r>
-              <a:rPr lang="en-US" sz="4000" i="1" dirty="0"/>
-              <a:t>least</a:t>
-            </a:r>
-            <a:r>
-              <a:rPr lang="en-US" sz="4000" dirty="0"/>
-              <a:t> opinionated </a:t>
-            </a:r>
-          </a:p>
-          <a:p>
-            <a:pPr marL="0" indent="0" algn="ctr">
-              <a:buNone/>
-            </a:pPr>
-            <a:r>
-              <a:rPr lang="en-US" sz="4000" dirty="0"/>
-              <a:t>to </a:t>
-            </a:r>
-          </a:p>
-          <a:p>
-            <a:pPr marL="0" indent="0" algn="ctr">
-              <a:buNone/>
-            </a:pPr>
-            <a:r>
-              <a:rPr lang="en-US" sz="4000" i="1" dirty="0"/>
-              <a:t>most</a:t>
-            </a:r>
-            <a:r>
-              <a:rPr lang="en-US" sz="4000" dirty="0"/>
-              <a:t> opinionated</a:t>
-            </a:r>
-            <a:endParaRPr lang="en-US" sz="3200" dirty="0">
-              <a:latin typeface="Calynda" panose="020B0609030804020204" pitchFamily="49" charset="0"/>
-              <a:ea typeface="Calynda" panose="020B0609030804020204" pitchFamily="49" charset="0"/>
-              <a:cs typeface="Calynda" panose="020B0609030804020204" pitchFamily="49" charset="0"/>
-            </a:endParaRPr>
-          </a:p>
-        </p:txBody>
-      </p:sp>
-    </p:spTree>
-    <p:extLst>
-      <p:ext uri="{BB962C8B-B14F-4D97-AF65-F5344CB8AC3E}">
-        <p14:creationId xmlns:p14="http://schemas.microsoft.com/office/powerpoint/2010/main" val="3739844900"/>
-      </p:ext>
-    </p:extLst>
-  </p:cSld>
-  <p:clrMapOvr>
-    <a:masterClrMapping/>
-  </p:clrMapOvr>
-  <p:transition>
-    <p:dissolve/>
-  </p:transition>
-</p:sld>
-</file>
-
 <file path=ppt/theme/theme1.xml><?xml version="1.0" encoding="utf-8"?>
 <a:theme xmlns:a="http://schemas.openxmlformats.org/drawingml/2006/main" name="Paragraph Slide">
   <a:themeElements>
@@ -24589,7 +25328,7 @@
         <a:effectLst/>
         <a:extLst>
           <a:ext uri="{AF507438-7753-43e0-B8FC-AC1667EBCBE1}">
-            <a14:hiddenEffects xmlns="" xmlns:a14="http://schemas.microsoft.com/office/drawing/2010/main">
+            <a14:hiddenEffects xmlns:a14="http://schemas.microsoft.com/office/drawing/2010/main" xmlns="">
               <a:effectLst>
                 <a:outerShdw blurRad="63500" dist="38099" dir="2700000" algn="ctr" rotWithShape="0">
                   <a:schemeClr val="bg2">
@@ -24669,7 +25408,7 @@
         <a:effectLst/>
         <a:extLst>
           <a:ext uri="{AF507438-7753-43e0-B8FC-AC1667EBCBE1}">
-            <a14:hiddenEffects xmlns="" xmlns:a14="http://schemas.microsoft.com/office/drawing/2010/main">
+            <a14:hiddenEffects xmlns:a14="http://schemas.microsoft.com/office/drawing/2010/main" xmlns="">
               <a:effectLst>
                 <a:outerShdw blurRad="63500" dist="38099" dir="2700000" algn="ctr" rotWithShape="0">
                   <a:schemeClr val="bg2">
@@ -25343,7 +26082,7 @@
         <a:effectLst/>
         <a:extLst>
           <a:ext uri="{AF507438-7753-43e0-B8FC-AC1667EBCBE1}">
-            <a14:hiddenEffects xmlns="" xmlns:a14="http://schemas.microsoft.com/office/drawing/2010/main">
+            <a14:hiddenEffects xmlns:a14="http://schemas.microsoft.com/office/drawing/2010/main" xmlns="">
               <a:effectLst>
                 <a:outerShdw blurRad="63500" dist="38099" dir="2700000" algn="ctr" rotWithShape="0">
                   <a:schemeClr val="bg2">
@@ -25423,7 +26162,7 @@
         <a:effectLst/>
         <a:extLst>
           <a:ext uri="{AF507438-7753-43e0-B8FC-AC1667EBCBE1}">
-            <a14:hiddenEffects xmlns="" xmlns:a14="http://schemas.microsoft.com/office/drawing/2010/main">
+            <a14:hiddenEffects xmlns:a14="http://schemas.microsoft.com/office/drawing/2010/main" xmlns="">
               <a:effectLst>
                 <a:outerShdw blurRad="63500" dist="38099" dir="2700000" algn="ctr" rotWithShape="0">
                   <a:schemeClr val="bg2">
@@ -26097,7 +26836,7 @@
         <a:effectLst/>
         <a:extLst>
           <a:ext uri="{AF507438-7753-43e0-B8FC-AC1667EBCBE1}">
-            <a14:hiddenEffects xmlns="" xmlns:a14="http://schemas.microsoft.com/office/drawing/2010/main">
+            <a14:hiddenEffects xmlns:a14="http://schemas.microsoft.com/office/drawing/2010/main" xmlns="">
               <a:effectLst>
                 <a:outerShdw blurRad="63500" dist="38099" dir="2700000" algn="ctr" rotWithShape="0">
                   <a:schemeClr val="bg2">
@@ -26177,7 +26916,7 @@
         <a:effectLst/>
         <a:extLst>
           <a:ext uri="{AF507438-7753-43e0-B8FC-AC1667EBCBE1}">
-            <a14:hiddenEffects xmlns="" xmlns:a14="http://schemas.microsoft.com/office/drawing/2010/main">
+            <a14:hiddenEffects xmlns:a14="http://schemas.microsoft.com/office/drawing/2010/main" xmlns="">
               <a:effectLst>
                 <a:outerShdw blurRad="63500" dist="38099" dir="2700000" algn="ctr" rotWithShape="0">
                   <a:schemeClr val="bg2">
@@ -26526,7 +27265,7 @@
         <a:effectLst/>
         <a:extLst>
           <a:ext uri="{AF507438-7753-43e0-B8FC-AC1667EBCBE1}">
-            <a14:hiddenEffects xmlns="" xmlns:a14="http://schemas.microsoft.com/office/drawing/2010/main">
+            <a14:hiddenEffects xmlns:a14="http://schemas.microsoft.com/office/drawing/2010/main" xmlns="">
               <a:effectLst>
                 <a:outerShdw blurRad="63500" dist="38099" dir="2700000" algn="ctr" rotWithShape="0">
                   <a:schemeClr val="bg2">
@@ -26606,7 +27345,7 @@
         <a:effectLst/>
         <a:extLst>
           <a:ext uri="{AF507438-7753-43e0-B8FC-AC1667EBCBE1}">
-            <a14:hiddenEffects xmlns="" xmlns:a14="http://schemas.microsoft.com/office/drawing/2010/main">
+            <a14:hiddenEffects xmlns:a14="http://schemas.microsoft.com/office/drawing/2010/main" xmlns="">
               <a:effectLst>
                 <a:outerShdw blurRad="63500" dist="38099" dir="2700000" algn="ctr" rotWithShape="0">
                   <a:schemeClr val="bg2">
@@ -26955,7 +27694,7 @@
         <a:effectLst/>
         <a:extLst>
           <a:ext uri="{AF507438-7753-43e0-B8FC-AC1667EBCBE1}">
-            <a14:hiddenEffects xmlns="" xmlns:a14="http://schemas.microsoft.com/office/drawing/2010/main">
+            <a14:hiddenEffects xmlns:a14="http://schemas.microsoft.com/office/drawing/2010/main" xmlns="">
               <a:effectLst>
                 <a:outerShdw blurRad="63500" dist="38099" dir="2700000" algn="ctr" rotWithShape="0">
                   <a:schemeClr val="bg2">
@@ -27035,7 +27774,7 @@
         <a:effectLst/>
         <a:extLst>
           <a:ext uri="{AF507438-7753-43e0-B8FC-AC1667EBCBE1}">
-            <a14:hiddenEffects xmlns="" xmlns:a14="http://schemas.microsoft.com/office/drawing/2010/main">
+            <a14:hiddenEffects xmlns:a14="http://schemas.microsoft.com/office/drawing/2010/main" xmlns="">
               <a:effectLst>
                 <a:outerShdw blurRad="63500" dist="38099" dir="2700000" algn="ctr" rotWithShape="0">
                   <a:schemeClr val="bg2">
@@ -27384,7 +28123,7 @@
         <a:effectLst/>
         <a:extLst>
           <a:ext uri="{AF507438-7753-43e0-B8FC-AC1667EBCBE1}">
-            <a14:hiddenEffects xmlns="" xmlns:a14="http://schemas.microsoft.com/office/drawing/2010/main">
+            <a14:hiddenEffects xmlns:a14="http://schemas.microsoft.com/office/drawing/2010/main" xmlns="">
               <a:effectLst>
                 <a:outerShdw blurRad="63500" dist="38099" dir="2700000" algn="ctr" rotWithShape="0">
                   <a:schemeClr val="bg2">
@@ -27464,7 +28203,7 @@
         <a:effectLst/>
         <a:extLst>
           <a:ext uri="{AF507438-7753-43e0-B8FC-AC1667EBCBE1}">
-            <a14:hiddenEffects xmlns="" xmlns:a14="http://schemas.microsoft.com/office/drawing/2010/main">
+            <a14:hiddenEffects xmlns:a14="http://schemas.microsoft.com/office/drawing/2010/main" xmlns="">
               <a:effectLst>
                 <a:outerShdw blurRad="63500" dist="38099" dir="2700000" algn="ctr" rotWithShape="0">
                   <a:schemeClr val="bg2">

</xml_diff>